<commit_message>
docs: ✏️ update the ppt
</commit_message>
<xml_diff>
--- a/rust_multisig.pptx
+++ b/rust_multisig.pptx
@@ -391,7 +391,7 @@
             <a:fld id="{B61BEF0D-F0BB-DE4B-95CE-6DB70DBA9567}" type="datetimeFigureOut">
               <a:rPr lang="en-US" dirty="0"/>
               <a:pPr/>
-              <a:t>8/30/2022</a:t>
+              <a:t>9/21/2022</a:t>
             </a:fld>
             <a:endParaRPr lang="en-US" dirty="0"/>
           </a:p>
@@ -722,7 +722,7 @@
             <a:fld id="{B61BEF0D-F0BB-DE4B-95CE-6DB70DBA9567}" type="datetimeFigureOut">
               <a:rPr lang="en-US" dirty="0"/>
               <a:pPr/>
-              <a:t>8/30/2022</a:t>
+              <a:t>9/21/2022</a:t>
             </a:fld>
             <a:endParaRPr lang="en-US" dirty="0"/>
           </a:p>
@@ -997,7 +997,7 @@
             <a:fld id="{B61BEF0D-F0BB-DE4B-95CE-6DB70DBA9567}" type="datetimeFigureOut">
               <a:rPr lang="en-US" dirty="0"/>
               <a:pPr/>
-              <a:t>8/30/2022</a:t>
+              <a:t>9/21/2022</a:t>
             </a:fld>
             <a:endParaRPr lang="en-US" dirty="0"/>
           </a:p>
@@ -1562,7 +1562,7 @@
             <a:fld id="{B61BEF0D-F0BB-DE4B-95CE-6DB70DBA9567}" type="datetimeFigureOut">
               <a:rPr lang="en-US" dirty="0"/>
               <a:pPr/>
-              <a:t>8/30/2022</a:t>
+              <a:t>9/21/2022</a:t>
             </a:fld>
             <a:endParaRPr lang="en-US" dirty="0"/>
           </a:p>
@@ -1837,7 +1837,7 @@
             <a:fld id="{B61BEF0D-F0BB-DE4B-95CE-6DB70DBA9567}" type="datetimeFigureOut">
               <a:rPr lang="en-US" dirty="0"/>
               <a:pPr/>
-              <a:t>8/30/2022</a:t>
+              <a:t>9/21/2022</a:t>
             </a:fld>
             <a:endParaRPr lang="en-US" dirty="0"/>
           </a:p>
@@ -2396,7 +2396,7 @@
             <a:fld id="{B61BEF0D-F0BB-DE4B-95CE-6DB70DBA9567}" type="datetimeFigureOut">
               <a:rPr lang="en-US" dirty="0"/>
               <a:pPr/>
-              <a:t>8/30/2022</a:t>
+              <a:t>9/21/2022</a:t>
             </a:fld>
             <a:endParaRPr lang="en-US" dirty="0"/>
           </a:p>
@@ -2720,7 +2720,7 @@
             <a:fld id="{B61BEF0D-F0BB-DE4B-95CE-6DB70DBA9567}" type="datetimeFigureOut">
               <a:rPr lang="en-US" dirty="0"/>
               <a:pPr/>
-              <a:t>8/30/2022</a:t>
+              <a:t>9/21/2022</a:t>
             </a:fld>
             <a:endParaRPr lang="en-US" dirty="0"/>
           </a:p>
@@ -2894,7 +2894,7 @@
             <a:fld id="{B61BEF0D-F0BB-DE4B-95CE-6DB70DBA9567}" type="datetimeFigureOut">
               <a:rPr lang="en-US" dirty="0"/>
               <a:pPr/>
-              <a:t>8/30/2022</a:t>
+              <a:t>9/21/2022</a:t>
             </a:fld>
             <a:endParaRPr lang="en-US" dirty="0"/>
           </a:p>
@@ -3129,7 +3129,7 @@
             <a:fld id="{B61BEF0D-F0BB-DE4B-95CE-6DB70DBA9567}" type="datetimeFigureOut">
               <a:rPr lang="en-US" dirty="0"/>
               <a:pPr/>
-              <a:t>8/30/2022</a:t>
+              <a:t>9/21/2022</a:t>
             </a:fld>
             <a:endParaRPr lang="en-US" dirty="0"/>
           </a:p>
@@ -3326,7 +3326,7 @@
             <a:fld id="{B61BEF0D-F0BB-DE4B-95CE-6DB70DBA9567}" type="datetimeFigureOut">
               <a:rPr lang="en-US" dirty="0"/>
               <a:pPr/>
-              <a:t>8/30/2022</a:t>
+              <a:t>9/21/2022</a:t>
             </a:fld>
             <a:endParaRPr lang="en-US" dirty="0"/>
           </a:p>
@@ -3599,7 +3599,7 @@
             <a:fld id="{B61BEF0D-F0BB-DE4B-95CE-6DB70DBA9567}" type="datetimeFigureOut">
               <a:rPr lang="en-US" dirty="0"/>
               <a:pPr/>
-              <a:t>8/30/2022</a:t>
+              <a:t>9/21/2022</a:t>
             </a:fld>
             <a:endParaRPr lang="en-US" dirty="0"/>
           </a:p>
@@ -3862,7 +3862,7 @@
             <a:fld id="{B61BEF0D-F0BB-DE4B-95CE-6DB70DBA9567}" type="datetimeFigureOut">
               <a:rPr lang="en-US" dirty="0"/>
               <a:pPr/>
-              <a:t>8/30/2022</a:t>
+              <a:t>9/21/2022</a:t>
             </a:fld>
             <a:endParaRPr lang="en-US" dirty="0"/>
           </a:p>
@@ -4233,7 +4233,7 @@
             <a:fld id="{B61BEF0D-F0BB-DE4B-95CE-6DB70DBA9567}" type="datetimeFigureOut">
               <a:rPr lang="en-US" dirty="0"/>
               <a:pPr/>
-              <a:t>8/30/2022</a:t>
+              <a:t>9/21/2022</a:t>
             </a:fld>
             <a:endParaRPr lang="en-US" dirty="0"/>
           </a:p>
@@ -4378,7 +4378,7 @@
             <a:fld id="{B61BEF0D-F0BB-DE4B-95CE-6DB70DBA9567}" type="datetimeFigureOut">
               <a:rPr lang="en-US" dirty="0"/>
               <a:pPr/>
-              <a:t>8/30/2022</a:t>
+              <a:t>9/21/2022</a:t>
             </a:fld>
             <a:endParaRPr lang="en-US" dirty="0"/>
           </a:p>
@@ -4500,7 +4500,7 @@
             <a:fld id="{B61BEF0D-F0BB-DE4B-95CE-6DB70DBA9567}" type="datetimeFigureOut">
               <a:rPr lang="en-US" dirty="0"/>
               <a:pPr/>
-              <a:t>8/30/2022</a:t>
+              <a:t>9/21/2022</a:t>
             </a:fld>
             <a:endParaRPr lang="en-US" dirty="0"/>
           </a:p>
@@ -4782,7 +4782,7 @@
             <a:fld id="{B61BEF0D-F0BB-DE4B-95CE-6DB70DBA9567}" type="datetimeFigureOut">
               <a:rPr lang="en-US" dirty="0"/>
               <a:pPr/>
-              <a:t>8/30/2022</a:t>
+              <a:t>9/21/2022</a:t>
             </a:fld>
             <a:endParaRPr lang="en-US" dirty="0"/>
           </a:p>
@@ -5103,7 +5103,7 @@
             <a:fld id="{B61BEF0D-F0BB-DE4B-95CE-6DB70DBA9567}" type="datetimeFigureOut">
               <a:rPr lang="en-US" dirty="0"/>
               <a:pPr/>
-              <a:t>8/30/2022</a:t>
+              <a:t>9/21/2022</a:t>
             </a:fld>
             <a:endParaRPr lang="en-US" dirty="0"/>
           </a:p>
@@ -5314,7 +5314,7 @@
             <a:fld id="{B61BEF0D-F0BB-DE4B-95CE-6DB70DBA9567}" type="datetimeFigureOut">
               <a:rPr lang="en-US" dirty="0"/>
               <a:pPr/>
-              <a:t>8/30/2022</a:t>
+              <a:t>9/21/2022</a:t>
             </a:fld>
             <a:endParaRPr lang="en-US" dirty="0"/>
           </a:p>
@@ -6350,10 +6350,9 @@
               <a:t> </a:t>
             </a:r>
             <a:r>
-              <a:rPr lang="zh-CN" altLang="en-US"/>
+              <a:rPr lang="zh-CN" altLang="en-US" dirty="0"/>
               <a:t>是为了写本文重建的一个例子</a:t>
             </a:r>
-            <a:endParaRPr lang="zh-CN" altLang="en-US" dirty="0"/>
           </a:p>
         </p:txBody>
       </p:sp>
@@ -6464,10 +6463,9 @@
               <a:t>安装</a:t>
             </a:r>
             <a:r>
-              <a:rPr lang="en-US" altLang="zh-CN" dirty="0" err="1"/>
-              <a:t>dcker</a:t>
-            </a:r>
-            <a:endParaRPr lang="en-US" altLang="zh-CN" dirty="0"/>
+              <a:rPr lang="en-US" altLang="zh-CN" dirty="0"/>
+              <a:t>docker</a:t>
+            </a:r>
           </a:p>
           <a:p>
             <a:r>
@@ -6725,7 +6723,7 @@
         <p:spPr/>
         <p:txBody>
           <a:bodyPr>
-            <a:normAutofit fontScale="92500" lnSpcReduction="10000"/>
+            <a:normAutofit lnSpcReduction="10000"/>
           </a:bodyPr>
           <a:lstStyle/>
           <a:p>
@@ -6753,6 +6751,67 @@
           </a:p>
           <a:p>
             <a:r>
+              <a:rPr lang="zh-CN" altLang="en-US" dirty="0"/>
+              <a:t>在</a:t>
+            </a:r>
+            <a:r>
+              <a:rPr lang="en-US" altLang="zh-CN" dirty="0"/>
+              <a:t>contracts/</a:t>
+            </a:r>
+            <a:r>
+              <a:rPr lang="en-US" altLang="zh-CN" dirty="0" err="1"/>
+              <a:t>ckb</a:t>
+            </a:r>
+            <a:r>
+              <a:rPr lang="en-US" altLang="zh-CN" dirty="0"/>
+              <a:t>-</a:t>
+            </a:r>
+            <a:r>
+              <a:rPr lang="en-US" altLang="zh-CN" dirty="0" err="1"/>
+              <a:t>multisig</a:t>
+            </a:r>
+            <a:r>
+              <a:rPr lang="en-US" altLang="zh-CN" dirty="0"/>
+              <a:t>-demo/</a:t>
+            </a:r>
+            <a:r>
+              <a:rPr lang="en-US" altLang="zh-CN" dirty="0" err="1"/>
+              <a:t>Cargo.toml</a:t>
+            </a:r>
+            <a:r>
+              <a:rPr lang="zh-CN" altLang="en-US" dirty="0"/>
+              <a:t>中的</a:t>
+            </a:r>
+            <a:r>
+              <a:rPr lang="en-US" altLang="zh-CN" dirty="0"/>
+              <a:t>[dependencies]</a:t>
+            </a:r>
+            <a:r>
+              <a:rPr lang="zh-CN" altLang="en-US" dirty="0"/>
+              <a:t>中添加依赖：</a:t>
+            </a:r>
+            <a:endParaRPr lang="en-US" altLang="zh-CN" dirty="0"/>
+          </a:p>
+          <a:p>
+            <a:pPr lvl="1"/>
+            <a:r>
+              <a:rPr lang="en-US" altLang="zh-CN" dirty="0" err="1"/>
+              <a:t>ckb</a:t>
+            </a:r>
+            <a:r>
+              <a:rPr lang="en-US" altLang="zh-CN" dirty="0"/>
+              <a:t>-std = "0.9.0“</a:t>
+            </a:r>
+          </a:p>
+          <a:p>
+            <a:pPr lvl="1"/>
+            <a:r>
+              <a:rPr lang="en-US" altLang="zh-CN" dirty="0"/>
+              <a:t>blake2b-ref = "0.2.1“</a:t>
+            </a:r>
+          </a:p>
+          <a:p>
+            <a:r>
               <a:rPr lang="en-US" altLang="zh-CN" dirty="0"/>
               <a:t>main </a:t>
             </a:r>
@@ -6955,70 +7014,6 @@
               <a:rPr lang="en-US" altLang="zh-CN" dirty="0"/>
               <a:t>)).pack()).build();</a:t>
             </a:r>
-          </a:p>
-          <a:p>
-            <a:r>
-              <a:rPr lang="zh-CN" altLang="en-US" dirty="0"/>
-              <a:t>在</a:t>
-            </a:r>
-            <a:r>
-              <a:rPr lang="en-US" altLang="zh-CN" dirty="0"/>
-              <a:t>contracts/</a:t>
-            </a:r>
-            <a:r>
-              <a:rPr lang="en-US" altLang="zh-CN" dirty="0" err="1"/>
-              <a:t>ckb</a:t>
-            </a:r>
-            <a:r>
-              <a:rPr lang="en-US" altLang="zh-CN" dirty="0"/>
-              <a:t>-</a:t>
-            </a:r>
-            <a:r>
-              <a:rPr lang="en-US" altLang="zh-CN" dirty="0" err="1"/>
-              <a:t>multisig</a:t>
-            </a:r>
-            <a:r>
-              <a:rPr lang="en-US" altLang="zh-CN" dirty="0"/>
-              <a:t>-demo/</a:t>
-            </a:r>
-            <a:r>
-              <a:rPr lang="en-US" altLang="zh-CN" dirty="0" err="1"/>
-              <a:t>Cargo.toml</a:t>
-            </a:r>
-            <a:r>
-              <a:rPr lang="zh-CN" altLang="en-US" dirty="0"/>
-              <a:t>中的</a:t>
-            </a:r>
-            <a:r>
-              <a:rPr lang="en-US" altLang="zh-CN" dirty="0"/>
-              <a:t>[dependencies]</a:t>
-            </a:r>
-            <a:r>
-              <a:rPr lang="zh-CN" altLang="en-US" dirty="0"/>
-              <a:t>中添加依赖：</a:t>
-            </a:r>
-            <a:endParaRPr lang="en-US" altLang="zh-CN" dirty="0"/>
-          </a:p>
-          <a:p>
-            <a:pPr lvl="1"/>
-            <a:r>
-              <a:rPr lang="en-US" altLang="zh-CN" dirty="0" err="1"/>
-              <a:t>ckb</a:t>
-            </a:r>
-            <a:r>
-              <a:rPr lang="en-US" altLang="zh-CN" dirty="0"/>
-              <a:t>-std = "0.9.0“</a:t>
-            </a:r>
-          </a:p>
-          <a:p>
-            <a:pPr lvl="1"/>
-            <a:r>
-              <a:rPr lang="en-US" altLang="zh-CN" dirty="0"/>
-              <a:t>blake2b-ref = "0.2.1“</a:t>
-            </a:r>
-          </a:p>
-          <a:p>
-            <a:endParaRPr lang="en-US" altLang="zh-CN" dirty="0"/>
           </a:p>
         </p:txBody>
       </p:sp>
@@ -7273,7 +7268,7 @@
             </a:r>
             <a:r>
               <a:rPr lang="en-US" altLang="zh-CN" dirty="0"/>
-              <a:t>and secp256k1_blake2b.c</a:t>
+              <a:t>secp256k1_blake2b.c</a:t>
             </a:r>
             <a:r>
               <a:rPr lang="zh-CN" altLang="en-US" dirty="0"/>
@@ -7448,13 +7443,67 @@
         <p:spPr/>
         <p:txBody>
           <a:bodyPr>
-            <a:normAutofit fontScale="85000" lnSpcReduction="20000"/>
+            <a:normAutofit fontScale="62500" lnSpcReduction="20000"/>
           </a:bodyPr>
           <a:lstStyle/>
           <a:p>
             <a:r>
               <a:rPr lang="en-US" altLang="zh-CN" dirty="0"/>
+              <a:t>Copy original tests:</a:t>
+            </a:r>
+          </a:p>
+          <a:p>
+            <a:pPr lvl="1"/>
+            <a:r>
+              <a:rPr lang="en-US" altLang="zh-CN" dirty="0"/>
               <a:t>copy </a:t>
+            </a:r>
+            <a:r>
+              <a:rPr lang="en-US" altLang="zh-CN" dirty="0" err="1">
+                <a:hlinkClick r:id="rId2"/>
+              </a:rPr>
+              <a:t>ckb</a:t>
+            </a:r>
+            <a:r>
+              <a:rPr lang="en-US" altLang="zh-CN" dirty="0">
+                <a:hlinkClick r:id="rId2"/>
+              </a:rPr>
+              <a:t>-system-scripts</a:t>
+            </a:r>
+            <a:r>
+              <a:rPr lang="en-US" altLang="zh-CN" dirty="0"/>
+              <a:t>/</a:t>
+            </a:r>
+            <a:r>
+              <a:rPr lang="en-US" altLang="zh-CN" dirty="0" err="1"/>
+              <a:t>src</a:t>
+            </a:r>
+            <a:r>
+              <a:rPr lang="en-US" altLang="zh-CN" dirty="0"/>
+              <a:t>/tests into workspace's </a:t>
+            </a:r>
+            <a:r>
+              <a:rPr lang="en-US" altLang="zh-CN" dirty="0" err="1"/>
+              <a:t>orig</a:t>
+            </a:r>
+            <a:r>
+              <a:rPr lang="en-US" altLang="zh-CN" dirty="0"/>
+              <a:t>-tests/</a:t>
+            </a:r>
+            <a:r>
+              <a:rPr lang="en-US" altLang="zh-CN" dirty="0" err="1"/>
+              <a:t>src</a:t>
+            </a:r>
+            <a:r>
+              <a:rPr lang="en-US" altLang="zh-CN" dirty="0"/>
+              <a:t> directory,</a:t>
+            </a:r>
+          </a:p>
+          <a:p>
+            <a:pPr lvl="1"/>
+            <a:r>
+              <a:rPr lang="en-US" altLang="zh-CN" dirty="0"/>
+              <a:t>mv mod.rs to lib.rs, copy </a:t>
             </a:r>
             <a:r>
               <a:rPr lang="en-US" altLang="zh-CN" dirty="0" err="1"/>
@@ -7466,11 +7515,11 @@
             </a:r>
             <a:r>
               <a:rPr lang="en-US" altLang="zh-CN" dirty="0" err="1"/>
-              <a:t>src</a:t>
-            </a:r>
-            <a:r>
-              <a:rPr lang="en-US" altLang="zh-CN" dirty="0"/>
-              <a:t>/tests into workspace's </a:t>
+              <a:t>Cargo.toml</a:t>
+            </a:r>
+            <a:r>
+              <a:rPr lang="en-US" altLang="zh-CN" dirty="0"/>
+              <a:t> to </a:t>
             </a:r>
             <a:r>
               <a:rPr lang="en-US" altLang="zh-CN" dirty="0" err="1"/>
@@ -7482,43 +7531,18 @@
             </a:r>
             <a:r>
               <a:rPr lang="en-US" altLang="zh-CN" dirty="0" err="1"/>
-              <a:t>src</a:t>
-            </a:r>
-            <a:r>
-              <a:rPr lang="en-US" altLang="zh-CN" dirty="0"/>
-              <a:t> directory, mv mod.rs to lib.rs, copy </a:t>
-            </a:r>
-            <a:r>
-              <a:rPr lang="en-US" altLang="zh-CN" dirty="0" err="1"/>
-              <a:t>ckb</a:t>
-            </a:r>
-            <a:r>
-              <a:rPr lang="en-US" altLang="zh-CN" dirty="0"/>
-              <a:t>-system-scripts/</a:t>
-            </a:r>
-            <a:r>
-              <a:rPr lang="en-US" altLang="zh-CN" dirty="0" err="1"/>
               <a:t>Cargo.toml</a:t>
             </a:r>
             <a:r>
               <a:rPr lang="en-US" altLang="zh-CN" dirty="0"/>
-              <a:t> to </a:t>
-            </a:r>
-            <a:r>
-              <a:rPr lang="en-US" altLang="zh-CN" dirty="0" err="1"/>
-              <a:t>orig</a:t>
-            </a:r>
-            <a:r>
-              <a:rPr lang="en-US" altLang="zh-CN" dirty="0"/>
-              <a:t>-tests/</a:t>
-            </a:r>
-            <a:r>
-              <a:rPr lang="en-US" altLang="zh-CN" dirty="0" err="1"/>
-              <a:t>Cargo.toml</a:t>
-            </a:r>
-            <a:r>
-              <a:rPr lang="en-US" altLang="zh-CN" dirty="0"/>
-              <a:t>, copy ckb-system-scripts/build.rs to orig-tests/build.rs</a:t>
+              <a:t>, </a:t>
+            </a:r>
+          </a:p>
+          <a:p>
+            <a:pPr lvl="1"/>
+            <a:r>
+              <a:rPr lang="en-US" altLang="zh-CN" dirty="0"/>
+              <a:t>copy ckb-system-scripts/build.rs to orig-tests/build.rs</a:t>
             </a:r>
           </a:p>
           <a:p>

</xml_diff>